<commit_message>
#02: Adds questions in xhtml format
</commit_message>
<xml_diff>
--- a/group_3/Group_3_Presentation.pptx
+++ b/group_3/Group_3_Presentation.pptx
@@ -109,6 +109,11 @@
       </a:defRPr>
     </a:lvl9pPr>
   </p:defaultTextStyle>
+  <p:extLst>
+    <p:ext uri="{EFAFB233-063F-42B5-8137-9DF3F51BA10A}">
+      <p15:sldGuideLst xmlns:p15="http://schemas.microsoft.com/office/powerpoint/2012/main"/>
+    </p:ext>
+  </p:extLst>
 </p:presentation>
 </file>
 
@@ -265,7 +270,7 @@
           <a:p>
             <a:fld id="{C128FA71-3A18-48C0-980F-4B68F7F63042}" type="datetime1">
               <a:rPr lang="en-US" smtClean="0"/>
-              <a:t>5/1/2025</a:t>
+              <a:t>5/12/2025</a:t>
             </a:fld>
             <a:endParaRPr lang="en-US"/>
           </a:p>
@@ -473,7 +478,7 @@
           <a:p>
             <a:fld id="{7104EDB3-C0E8-45F8-9E1D-1B6C8D1880C0}" type="datetime1">
               <a:rPr lang="en-US" smtClean="0"/>
-              <a:t>5/1/2025</a:t>
+              <a:t>5/12/2025</a:t>
             </a:fld>
             <a:endParaRPr lang="en-US"/>
           </a:p>
@@ -683,7 +688,7 @@
           <a:p>
             <a:fld id="{9CF0EC4B-54ED-4041-B552-9BA760FA3DBA}" type="datetime1">
               <a:rPr lang="en-US" smtClean="0"/>
-              <a:t>5/1/2025</a:t>
+              <a:t>5/12/2025</a:t>
             </a:fld>
             <a:endParaRPr lang="en-US"/>
           </a:p>
@@ -881,7 +886,7 @@
           <a:p>
             <a:fld id="{51C1210E-201E-4473-82AC-2466F5386C38}" type="datetime1">
               <a:rPr lang="en-US" smtClean="0"/>
-              <a:t>5/1/2025</a:t>
+              <a:t>5/12/2025</a:t>
             </a:fld>
             <a:endParaRPr lang="en-US"/>
           </a:p>
@@ -1159,7 +1164,7 @@
           <a:p>
             <a:fld id="{B01EA198-6CAB-4B8F-B93F-1F9C8C4B6CE7}" type="datetime1">
               <a:rPr lang="en-US" smtClean="0"/>
-              <a:t>5/1/2025</a:t>
+              <a:t>5/12/2025</a:t>
             </a:fld>
             <a:endParaRPr lang="en-US"/>
           </a:p>
@@ -1431,7 +1436,7 @@
           <a:p>
             <a:fld id="{CA06041F-4525-44D5-AA4F-332294BF1F56}" type="datetime1">
               <a:rPr lang="en-US" smtClean="0"/>
-              <a:t>5/1/2025</a:t>
+              <a:t>5/12/2025</a:t>
             </a:fld>
             <a:endParaRPr lang="en-US"/>
           </a:p>
@@ -1855,7 +1860,7 @@
           <a:p>
             <a:fld id="{F9557091-BBDF-4EB9-BA6B-2BB67AC4FC0F}" type="datetime1">
               <a:rPr lang="en-US" smtClean="0"/>
-              <a:t>5/1/2025</a:t>
+              <a:t>5/12/2025</a:t>
             </a:fld>
             <a:endParaRPr lang="en-US"/>
           </a:p>
@@ -1996,7 +2001,7 @@
           <a:p>
             <a:fld id="{2D6B226B-77A6-410C-9796-083F278E0125}" type="datetime1">
               <a:rPr lang="en-US" smtClean="0"/>
-              <a:t>5/1/2025</a:t>
+              <a:t>5/12/2025</a:t>
             </a:fld>
             <a:endParaRPr lang="en-US"/>
           </a:p>
@@ -2109,7 +2114,7 @@
           <a:p>
             <a:fld id="{A23A578B-D289-4C40-8593-3D356C49DA58}" type="datetime1">
               <a:rPr lang="en-US" smtClean="0"/>
-              <a:t>5/1/2025</a:t>
+              <a:t>5/12/2025</a:t>
             </a:fld>
             <a:endParaRPr lang="en-US"/>
           </a:p>
@@ -2428,7 +2433,7 @@
           <a:p>
             <a:fld id="{713DFAE3-14DB-48A7-A80F-80DDB072CE3D}" type="datetime1">
               <a:rPr lang="en-US" smtClean="0"/>
-              <a:t>5/1/2025</a:t>
+              <a:t>5/12/2025</a:t>
             </a:fld>
             <a:endParaRPr lang="en-US"/>
           </a:p>
@@ -2722,7 +2727,7 @@
           <a:p>
             <a:fld id="{92C5EAEF-6478-4102-8F5D-A5FE9FC97ACB}" type="datetime1">
               <a:rPr lang="en-US" smtClean="0"/>
-              <a:t>5/1/2025</a:t>
+              <a:t>5/12/2025</a:t>
             </a:fld>
             <a:endParaRPr lang="en-US"/>
           </a:p>
@@ -2963,7 +2968,7 @@
           <a:p>
             <a:fld id="{67F45AC6-C491-4585-A584-9CE2AF7D5500}" type="datetime1">
               <a:rPr lang="en-US" smtClean="0"/>
-              <a:t>5/1/2025</a:t>
+              <a:t>5/12/2025</a:t>
             </a:fld>
             <a:endParaRPr lang="en-US"/>
           </a:p>
@@ -4836,7 +4841,7 @@
             </a:pPr>
             <a:r>
               <a:rPr lang="de-DE" dirty="0"/>
-              <a:t>	</a:t>
+              <a:t>	- </a:t>
             </a:r>
             <a:r>
               <a:rPr lang="de-DE" dirty="0" err="1"/>

</xml_diff>